<commit_message>
last update after course UM2 M1
</commit_message>
<xml_diff>
--- a/docs/cours-fac-python.pptx
+++ b/docs/cours-fac-python.pptx
@@ -216,7 +216,7 @@
           <a:p>
             <a:fld id="{724A4007-2998-AD43-A629-A61FD844D9CC}" type="datetimeFigureOut">
               <a:rPr lang="fr-FR" smtClean="0"/>
-              <a:t>11/03/2025</a:t>
+              <a:t>13/03/2025</a:t>
             </a:fld>
             <a:endParaRPr lang="fr-FR"/>
           </a:p>
@@ -716,6 +716,90 @@
           <a:p>
             <a:fld id="{E16A1AC0-7C6A-614B-8DFC-4810413CBA5F}" type="slidenum">
               <a:rPr lang="fr-FR" smtClean="0"/>
+              <a:t>8</a:t>
+            </a:fld>
+            <a:endParaRPr lang="fr-FR"/>
+          </a:p>
+        </p:txBody>
+      </p:sp>
+    </p:spTree>
+    <p:extLst>
+      <p:ext uri="{BB962C8B-B14F-4D97-AF65-F5344CB8AC3E}">
+        <p14:creationId xmlns:p14="http://schemas.microsoft.com/office/powerpoint/2010/main" val="3671592935"/>
+      </p:ext>
+    </p:extLst>
+  </p:cSld>
+  <p:clrMapOvr>
+    <a:masterClrMapping/>
+  </p:clrMapOvr>
+</p:notes>
+</file>
+
+<file path=ppt/notesSlides/notesSlide4.xml><?xml version="1.0" encoding="utf-8"?>
+<p:notes xmlns:a="http://schemas.openxmlformats.org/drawingml/2006/main" xmlns:r="http://schemas.openxmlformats.org/officeDocument/2006/relationships" xmlns:p="http://schemas.openxmlformats.org/presentationml/2006/main">
+  <p:cSld>
+    <p:spTree>
+      <p:nvGrpSpPr>
+        <p:cNvPr id="1" name=""/>
+        <p:cNvGrpSpPr/>
+        <p:nvPr/>
+      </p:nvGrpSpPr>
+      <p:grpSpPr>
+        <a:xfrm>
+          <a:off x="0" y="0"/>
+          <a:ext cx="0" cy="0"/>
+          <a:chOff x="0" y="0"/>
+          <a:chExt cx="0" cy="0"/>
+        </a:xfrm>
+      </p:grpSpPr>
+      <p:sp>
+        <p:nvSpPr>
+          <p:cNvPr id="2" name="Espace réservé de l'image des diapositives 1"/>
+          <p:cNvSpPr>
+            <a:spLocks noGrp="1" noRot="1" noChangeAspect="1"/>
+          </p:cNvSpPr>
+          <p:nvPr>
+            <p:ph type="sldImg"/>
+          </p:nvPr>
+        </p:nvSpPr>
+        <p:spPr/>
+      </p:sp>
+      <p:sp>
+        <p:nvSpPr>
+          <p:cNvPr id="3" name="Espace réservé des notes 2"/>
+          <p:cNvSpPr>
+            <a:spLocks noGrp="1"/>
+          </p:cNvSpPr>
+          <p:nvPr>
+            <p:ph type="body" idx="1"/>
+          </p:nvPr>
+        </p:nvSpPr>
+        <p:spPr/>
+        <p:txBody>
+          <a:bodyPr/>
+          <a:lstStyle/>
+          <a:p>
+            <a:endParaRPr lang="fr-FR" dirty="0"/>
+          </a:p>
+        </p:txBody>
+      </p:sp>
+      <p:sp>
+        <p:nvSpPr>
+          <p:cNvPr id="4" name="Espace réservé du numéro de diapositive 3"/>
+          <p:cNvSpPr>
+            <a:spLocks noGrp="1"/>
+          </p:cNvSpPr>
+          <p:nvPr>
+            <p:ph type="sldNum" sz="quarter" idx="5"/>
+          </p:nvPr>
+        </p:nvSpPr>
+        <p:spPr/>
+        <p:txBody>
+          <a:bodyPr/>
+          <a:lstStyle/>
+          <a:p>
+            <a:fld id="{E16A1AC0-7C6A-614B-8DFC-4810413CBA5F}" type="slidenum">
+              <a:rPr lang="fr-FR" smtClean="0"/>
               <a:t>20</a:t>
             </a:fld>
             <a:endParaRPr lang="fr-FR"/>
@@ -882,7 +966,7 @@
           <a:p>
             <a:fld id="{5AEE40CF-616E-9744-B1FC-A9FF4F5E1AC7}" type="datetimeFigureOut">
               <a:rPr lang="fr-FR" smtClean="0"/>
-              <a:t>11/03/2025</a:t>
+              <a:t>13/03/2025</a:t>
             </a:fld>
             <a:endParaRPr lang="fr-FR"/>
           </a:p>
@@ -1080,7 +1164,7 @@
           <a:p>
             <a:fld id="{5AEE40CF-616E-9744-B1FC-A9FF4F5E1AC7}" type="datetimeFigureOut">
               <a:rPr lang="fr-FR" smtClean="0"/>
-              <a:t>11/03/2025</a:t>
+              <a:t>13/03/2025</a:t>
             </a:fld>
             <a:endParaRPr lang="fr-FR"/>
           </a:p>
@@ -1288,7 +1372,7 @@
           <a:p>
             <a:fld id="{5AEE40CF-616E-9744-B1FC-A9FF4F5E1AC7}" type="datetimeFigureOut">
               <a:rPr lang="fr-FR" smtClean="0"/>
-              <a:t>11/03/2025</a:t>
+              <a:t>13/03/2025</a:t>
             </a:fld>
             <a:endParaRPr lang="fr-FR"/>
           </a:p>
@@ -1486,7 +1570,7 @@
           <a:p>
             <a:fld id="{5AEE40CF-616E-9744-B1FC-A9FF4F5E1AC7}" type="datetimeFigureOut">
               <a:rPr lang="fr-FR" smtClean="0"/>
-              <a:t>11/03/2025</a:t>
+              <a:t>13/03/2025</a:t>
             </a:fld>
             <a:endParaRPr lang="fr-FR"/>
           </a:p>
@@ -1761,7 +1845,7 @@
           <a:p>
             <a:fld id="{5AEE40CF-616E-9744-B1FC-A9FF4F5E1AC7}" type="datetimeFigureOut">
               <a:rPr lang="fr-FR" smtClean="0"/>
-              <a:t>11/03/2025</a:t>
+              <a:t>13/03/2025</a:t>
             </a:fld>
             <a:endParaRPr lang="fr-FR"/>
           </a:p>
@@ -2026,7 +2110,7 @@
           <a:p>
             <a:fld id="{5AEE40CF-616E-9744-B1FC-A9FF4F5E1AC7}" type="datetimeFigureOut">
               <a:rPr lang="fr-FR" smtClean="0"/>
-              <a:t>11/03/2025</a:t>
+              <a:t>13/03/2025</a:t>
             </a:fld>
             <a:endParaRPr lang="fr-FR"/>
           </a:p>
@@ -2438,7 +2522,7 @@
           <a:p>
             <a:fld id="{5AEE40CF-616E-9744-B1FC-A9FF4F5E1AC7}" type="datetimeFigureOut">
               <a:rPr lang="fr-FR" smtClean="0"/>
-              <a:t>11/03/2025</a:t>
+              <a:t>13/03/2025</a:t>
             </a:fld>
             <a:endParaRPr lang="fr-FR"/>
           </a:p>
@@ -2579,7 +2663,7 @@
           <a:p>
             <a:fld id="{5AEE40CF-616E-9744-B1FC-A9FF4F5E1AC7}" type="datetimeFigureOut">
               <a:rPr lang="fr-FR" smtClean="0"/>
-              <a:t>11/03/2025</a:t>
+              <a:t>13/03/2025</a:t>
             </a:fld>
             <a:endParaRPr lang="fr-FR"/>
           </a:p>
@@ -2692,7 +2776,7 @@
           <a:p>
             <a:fld id="{5AEE40CF-616E-9744-B1FC-A9FF4F5E1AC7}" type="datetimeFigureOut">
               <a:rPr lang="fr-FR" smtClean="0"/>
-              <a:t>11/03/2025</a:t>
+              <a:t>13/03/2025</a:t>
             </a:fld>
             <a:endParaRPr lang="fr-FR"/>
           </a:p>
@@ -3003,7 +3087,7 @@
           <a:p>
             <a:fld id="{5AEE40CF-616E-9744-B1FC-A9FF4F5E1AC7}" type="datetimeFigureOut">
               <a:rPr lang="fr-FR" smtClean="0"/>
-              <a:t>11/03/2025</a:t>
+              <a:t>13/03/2025</a:t>
             </a:fld>
             <a:endParaRPr lang="fr-FR"/>
           </a:p>
@@ -3291,7 +3375,7 @@
           <a:p>
             <a:fld id="{5AEE40CF-616E-9744-B1FC-A9FF4F5E1AC7}" type="datetimeFigureOut">
               <a:rPr lang="fr-FR" smtClean="0"/>
-              <a:t>11/03/2025</a:t>
+              <a:t>13/03/2025</a:t>
             </a:fld>
             <a:endParaRPr lang="fr-FR"/>
           </a:p>
@@ -3532,7 +3616,7 @@
           <a:p>
             <a:fld id="{5AEE40CF-616E-9744-B1FC-A9FF4F5E1AC7}" type="datetimeFigureOut">
               <a:rPr lang="fr-FR" smtClean="0"/>
-              <a:t>11/03/2025</a:t>
+              <a:t>13/03/2025</a:t>
             </a:fld>
             <a:endParaRPr lang="fr-FR"/>
           </a:p>
@@ -4030,6 +4114,13 @@
             <a:r>
               <a:rPr lang="fr-FR" sz="4000" dirty="0"/>
               <a:t>Frantz Maerten</a:t>
+            </a:r>
+            <a:br>
+              <a:rPr lang="fr-FR" sz="4000" dirty="0"/>
+            </a:br>
+            <a:r>
+              <a:rPr lang="fr-FR" sz="4000" dirty="0"/>
+              <a:t>BRGM</a:t>
             </a:r>
           </a:p>
         </p:txBody>
@@ -19763,7 +19854,7 @@
           <p:nvPr/>
         </p:nvPicPr>
         <p:blipFill rotWithShape="1">
-          <a:blip r:embed="rId2">
+          <a:blip r:embed="rId3">
             <a:extLst>
               <a:ext uri="{28A0092B-C50C-407E-A947-70E740481C1C}">
                 <a14:useLocalDpi xmlns:a14="http://schemas.microsoft.com/office/drawing/2010/main" val="0"/>

</xml_diff>